<commit_message>
update ppt link repo
</commit_message>
<xml_diff>
--- a/PISCO_clase.pptx
+++ b/PISCO_clase.pptx
@@ -4133,11 +4133,7 @@
             </a:r>
             <a:r>
               <a:rPr lang="es-PE" sz="2000" dirty="0" smtClean="0"/>
-              <a:t>GEOESTADÍSTICA Y </a:t>
-            </a:r>
-            <a:r>
-              <a:rPr lang="es-PE" sz="2000" dirty="0" smtClean="0"/>
-              <a:t>DETERMINÍSTICA, </a:t>
+              <a:t>GEOESTADÍSTICA Y DETERMINÍSTICA, </a:t>
             </a:r>
             <a:r>
               <a:rPr lang="es-PE" sz="2000" dirty="0"/>
@@ -4220,23 +4216,7 @@
             </a:r>
             <a:r>
               <a:rPr lang="es-PE" sz="2000" dirty="0" smtClean="0"/>
-              <a:t>Sin embargo solo pasan el control de calidad </a:t>
-            </a:r>
-            <a:r>
-              <a:rPr lang="es-PE" sz="2000" dirty="0" smtClean="0"/>
-              <a:t>441 </a:t>
-            </a:r>
-            <a:r>
-              <a:rPr lang="es-PE" sz="2000" dirty="0" smtClean="0"/>
-              <a:t>estaciones que cubren </a:t>
-            </a:r>
-            <a:r>
-              <a:rPr lang="es-PE" sz="2000" dirty="0" smtClean="0"/>
-              <a:t>aproximadamente un poco más de un 20% </a:t>
-            </a:r>
-            <a:r>
-              <a:rPr lang="es-PE" sz="2000" dirty="0" smtClean="0"/>
-              <a:t>del territorio.</a:t>
+              <a:t>Sin embargo solo pasan el control de calidad 441 estaciones que cubren aproximadamente un poco más de un 20% del territorio.</a:t>
             </a:r>
           </a:p>
         </p:txBody>
@@ -5440,8 +5420,10 @@
           </a:p>
           <a:p>
             <a:r>
-              <a:rPr lang="es-PE" b="1" dirty="0" err="1" smtClean="0"/>
-              <a:t>mnbvcx</a:t>
+              <a:rPr lang="es-PE" dirty="0">
+                <a:hlinkClick r:id="rId2"/>
+              </a:rPr>
+              <a:t>https://github.com/manu9418/PISCO_clase</a:t>
             </a:r>
             <a:endParaRPr lang="es-PE" dirty="0"/>
           </a:p>

</xml_diff>

<commit_message>
update ppt 2 link binder
</commit_message>
<xml_diff>
--- a/PISCO_clase.pptx
+++ b/PISCO_clase.pptx
@@ -5420,10 +5420,10 @@
           </a:p>
           <a:p>
             <a:r>
-              <a:rPr lang="es-PE" dirty="0">
+              <a:rPr lang="es-PE">
                 <a:hlinkClick r:id="rId2"/>
               </a:rPr>
-              <a:t>https://github.com/manu9418/PISCO_clase</a:t>
+              <a:t>https://mybinder.org/v2/gh/manu9418/PISCO_clase/master</a:t>
             </a:r>
             <a:endParaRPr lang="es-PE" dirty="0"/>
           </a:p>

</xml_diff>